<commit_message>
Revert "Updating navigation diagram"
This reverts commit ce6c3be2a28062fe7d92d9a80a4aaffaeae0d813.
</commit_message>
<xml_diff>
--- a/docs/navigation-flow.pptx
+++ b/docs/navigation-flow.pptx
@@ -104,11 +104,6 @@
       </a:defRPr>
     </a:lvl9pPr>
   </p:defaultTextStyle>
-  <p:extLst>
-    <p:ext uri="{EFAFB233-063F-42B5-8137-9DF3F51BA10A}">
-      <p15:sldGuideLst xmlns:p15="http://schemas.microsoft.com/office/powerpoint/2012/main"/>
-    </p:ext>
-  </p:extLst>
 </p:presentation>
 </file>
 
@@ -259,7 +254,7 @@
           <a:p>
             <a:fld id="{BFE6E6C1-1C6F-C94D-9489-FC24A85AB066}" type="datetimeFigureOut">
               <a:rPr lang="en-US" smtClean="0"/>
-              <a:t>3/26/20</a:t>
+              <a:t>3/15/20</a:t>
             </a:fld>
             <a:endParaRPr lang="en-US"/>
           </a:p>
@@ -457,7 +452,7 @@
           <a:p>
             <a:fld id="{BFE6E6C1-1C6F-C94D-9489-FC24A85AB066}" type="datetimeFigureOut">
               <a:rPr lang="en-US" smtClean="0"/>
-              <a:t>3/26/20</a:t>
+              <a:t>3/15/20</a:t>
             </a:fld>
             <a:endParaRPr lang="en-US"/>
           </a:p>
@@ -665,7 +660,7 @@
           <a:p>
             <a:fld id="{BFE6E6C1-1C6F-C94D-9489-FC24A85AB066}" type="datetimeFigureOut">
               <a:rPr lang="en-US" smtClean="0"/>
-              <a:t>3/26/20</a:t>
+              <a:t>3/15/20</a:t>
             </a:fld>
             <a:endParaRPr lang="en-US"/>
           </a:p>
@@ -863,7 +858,7 @@
           <a:p>
             <a:fld id="{BFE6E6C1-1C6F-C94D-9489-FC24A85AB066}" type="datetimeFigureOut">
               <a:rPr lang="en-US" smtClean="0"/>
-              <a:t>3/26/20</a:t>
+              <a:t>3/15/20</a:t>
             </a:fld>
             <a:endParaRPr lang="en-US"/>
           </a:p>
@@ -1138,7 +1133,7 @@
           <a:p>
             <a:fld id="{BFE6E6C1-1C6F-C94D-9489-FC24A85AB066}" type="datetimeFigureOut">
               <a:rPr lang="en-US" smtClean="0"/>
-              <a:t>3/26/20</a:t>
+              <a:t>3/15/20</a:t>
             </a:fld>
             <a:endParaRPr lang="en-US"/>
           </a:p>
@@ -1403,7 +1398,7 @@
           <a:p>
             <a:fld id="{BFE6E6C1-1C6F-C94D-9489-FC24A85AB066}" type="datetimeFigureOut">
               <a:rPr lang="en-US" smtClean="0"/>
-              <a:t>3/26/20</a:t>
+              <a:t>3/15/20</a:t>
             </a:fld>
             <a:endParaRPr lang="en-US"/>
           </a:p>
@@ -1815,7 +1810,7 @@
           <a:p>
             <a:fld id="{BFE6E6C1-1C6F-C94D-9489-FC24A85AB066}" type="datetimeFigureOut">
               <a:rPr lang="en-US" smtClean="0"/>
-              <a:t>3/26/20</a:t>
+              <a:t>3/15/20</a:t>
             </a:fld>
             <a:endParaRPr lang="en-US"/>
           </a:p>
@@ -1956,7 +1951,7 @@
           <a:p>
             <a:fld id="{BFE6E6C1-1C6F-C94D-9489-FC24A85AB066}" type="datetimeFigureOut">
               <a:rPr lang="en-US" smtClean="0"/>
-              <a:t>3/26/20</a:t>
+              <a:t>3/15/20</a:t>
             </a:fld>
             <a:endParaRPr lang="en-US"/>
           </a:p>
@@ -2069,7 +2064,7 @@
           <a:p>
             <a:fld id="{BFE6E6C1-1C6F-C94D-9489-FC24A85AB066}" type="datetimeFigureOut">
               <a:rPr lang="en-US" smtClean="0"/>
-              <a:t>3/26/20</a:t>
+              <a:t>3/15/20</a:t>
             </a:fld>
             <a:endParaRPr lang="en-US"/>
           </a:p>
@@ -2380,7 +2375,7 @@
           <a:p>
             <a:fld id="{BFE6E6C1-1C6F-C94D-9489-FC24A85AB066}" type="datetimeFigureOut">
               <a:rPr lang="en-US" smtClean="0"/>
-              <a:t>3/26/20</a:t>
+              <a:t>3/15/20</a:t>
             </a:fld>
             <a:endParaRPr lang="en-US"/>
           </a:p>
@@ -2668,7 +2663,7 @@
           <a:p>
             <a:fld id="{BFE6E6C1-1C6F-C94D-9489-FC24A85AB066}" type="datetimeFigureOut">
               <a:rPr lang="en-US" smtClean="0"/>
-              <a:t>3/26/20</a:t>
+              <a:t>3/15/20</a:t>
             </a:fld>
             <a:endParaRPr lang="en-US"/>
           </a:p>
@@ -2909,7 +2904,7 @@
           <a:p>
             <a:fld id="{BFE6E6C1-1C6F-C94D-9489-FC24A85AB066}" type="datetimeFigureOut">
               <a:rPr lang="en-US" smtClean="0"/>
-              <a:t>3/26/20</a:t>
+              <a:t>3/15/20</a:t>
             </a:fld>
             <a:endParaRPr lang="en-US"/>
           </a:p>
@@ -3340,8 +3335,8 @@
         </p:nvSpPr>
         <p:spPr>
           <a:xfrm>
-            <a:off x="3171290" y="1279335"/>
-            <a:ext cx="1589071" cy="636998"/>
+            <a:off x="5633662" y="534257"/>
+            <a:ext cx="2137025" cy="904126"/>
           </a:xfrm>
           <a:prstGeom prst="rect">
             <a:avLst/>
@@ -3389,8 +3384,8 @@
         </p:nvSpPr>
         <p:spPr>
           <a:xfrm>
-            <a:off x="1747887" y="2356609"/>
-            <a:ext cx="1589072" cy="636997"/>
+            <a:off x="3789451" y="1929830"/>
+            <a:ext cx="2137025" cy="904126"/>
           </a:xfrm>
           <a:prstGeom prst="rect">
             <a:avLst/>
@@ -3438,8 +3433,8 @@
         </p:nvSpPr>
         <p:spPr>
           <a:xfrm>
-            <a:off x="4460698" y="2356609"/>
-            <a:ext cx="1732908" cy="636997"/>
+            <a:off x="7477876" y="1929830"/>
+            <a:ext cx="2137025" cy="904126"/>
           </a:xfrm>
           <a:prstGeom prst="rect">
             <a:avLst/>
@@ -3468,7 +3463,7 @@
             <a:pPr algn="ctr"/>
             <a:r>
               <a:rPr lang="en-US" dirty="0"/>
-              <a:t>Modal Screen</a:t>
+              <a:t>Auth Screen</a:t>
             </a:r>
           </a:p>
         </p:txBody>
@@ -3487,8 +3482,8 @@
         </p:nvSpPr>
         <p:spPr>
           <a:xfrm>
-            <a:off x="325349" y="3824101"/>
-            <a:ext cx="1589072" cy="636997"/>
+            <a:off x="1198651" y="3592531"/>
+            <a:ext cx="2137025" cy="904126"/>
           </a:xfrm>
           <a:prstGeom prst="rect">
             <a:avLst/>
@@ -3536,8 +3531,8 @@
         </p:nvSpPr>
         <p:spPr>
           <a:xfrm>
-            <a:off x="3057417" y="4273871"/>
-            <a:ext cx="1589072" cy="636997"/>
+            <a:off x="4977828" y="3592531"/>
+            <a:ext cx="2137025" cy="904126"/>
           </a:xfrm>
           <a:prstGeom prst="rect">
             <a:avLst/>
@@ -3585,8 +3580,8 @@
         </p:nvSpPr>
         <p:spPr>
           <a:xfrm>
-            <a:off x="4896171" y="3798797"/>
-            <a:ext cx="1589072" cy="636997"/>
+            <a:off x="8637141" y="3592531"/>
+            <a:ext cx="2137025" cy="904126"/>
           </a:xfrm>
           <a:prstGeom prst="rect">
             <a:avLst/>
@@ -3630,7 +3625,6 @@
             </a:extLst>
           </p:cNvPr>
           <p:cNvCxnSpPr>
-            <a:cxnSpLocks/>
             <a:stCxn id="4" idx="2"/>
             <a:endCxn id="5" idx="0"/>
           </p:cNvCxnSpPr>
@@ -3638,8 +3632,8 @@
         </p:nvCxnSpPr>
         <p:spPr>
           <a:xfrm flipH="1">
-            <a:off x="2542423" y="1916333"/>
-            <a:ext cx="1423403" cy="440276"/>
+            <a:off x="4857964" y="1438383"/>
+            <a:ext cx="1844211" cy="491447"/>
           </a:xfrm>
           <a:prstGeom prst="line">
             <a:avLst/>
@@ -3670,7 +3664,6 @@
             </a:extLst>
           </p:cNvPr>
           <p:cNvCxnSpPr>
-            <a:cxnSpLocks/>
             <a:stCxn id="4" idx="2"/>
             <a:endCxn id="6" idx="0"/>
           </p:cNvCxnSpPr>
@@ -3678,8 +3671,8 @@
         </p:nvCxnSpPr>
         <p:spPr>
           <a:xfrm>
-            <a:off x="3965826" y="1916333"/>
-            <a:ext cx="1361326" cy="440276"/>
+            <a:off x="6702175" y="1438383"/>
+            <a:ext cx="1844214" cy="491447"/>
           </a:xfrm>
           <a:prstGeom prst="line">
             <a:avLst/>
@@ -3710,7 +3703,6 @@
             </a:extLst>
           </p:cNvPr>
           <p:cNvCxnSpPr>
-            <a:cxnSpLocks/>
             <a:stCxn id="5" idx="2"/>
             <a:endCxn id="7" idx="0"/>
           </p:cNvCxnSpPr>
@@ -3718,8 +3710,8 @@
         </p:nvCxnSpPr>
         <p:spPr>
           <a:xfrm flipH="1">
-            <a:off x="1119885" y="2993606"/>
-            <a:ext cx="1422538" cy="830495"/>
+            <a:off x="2267164" y="2833956"/>
+            <a:ext cx="2590800" cy="758575"/>
           </a:xfrm>
           <a:prstGeom prst="line">
             <a:avLst/>
@@ -3750,7 +3742,6 @@
             </a:extLst>
           </p:cNvPr>
           <p:cNvCxnSpPr>
-            <a:cxnSpLocks/>
             <a:stCxn id="5" idx="2"/>
             <a:endCxn id="8" idx="0"/>
           </p:cNvCxnSpPr>
@@ -3758,8 +3749,8 @@
         </p:nvCxnSpPr>
         <p:spPr>
           <a:xfrm>
-            <a:off x="2542423" y="2993606"/>
-            <a:ext cx="1309530" cy="1280265"/>
+            <a:off x="4857964" y="2833956"/>
+            <a:ext cx="1188377" cy="758575"/>
           </a:xfrm>
           <a:prstGeom prst="line">
             <a:avLst/>
@@ -3790,7 +3781,6 @@
             </a:extLst>
           </p:cNvPr>
           <p:cNvCxnSpPr>
-            <a:cxnSpLocks/>
             <a:stCxn id="5" idx="2"/>
             <a:endCxn id="9" idx="0"/>
           </p:cNvCxnSpPr>
@@ -3798,8 +3788,8 @@
         </p:nvCxnSpPr>
         <p:spPr>
           <a:xfrm>
-            <a:off x="2542423" y="2993606"/>
-            <a:ext cx="3148284" cy="805191"/>
+            <a:off x="4857964" y="2833956"/>
+            <a:ext cx="4847690" cy="758575"/>
           </a:xfrm>
           <a:prstGeom prst="line">
             <a:avLst/>
@@ -3834,7 +3824,7 @@
         </p:nvSpPr>
         <p:spPr>
           <a:xfrm>
-            <a:off x="4760361" y="1475908"/>
+            <a:off x="7770687" y="894256"/>
             <a:ext cx="1732908" cy="276999"/>
           </a:xfrm>
           <a:prstGeom prst="rect">
@@ -3882,7 +3872,7 @@
         </p:nvSpPr>
         <p:spPr>
           <a:xfrm>
-            <a:off x="4469256" y="2973462"/>
+            <a:off x="9614900" y="2243393"/>
             <a:ext cx="1881881" cy="276999"/>
           </a:xfrm>
           <a:prstGeom prst="rect">
@@ -3930,8 +3920,8 @@
         </p:nvSpPr>
         <p:spPr>
           <a:xfrm>
-            <a:off x="325349" y="5447017"/>
-            <a:ext cx="1589073" cy="636997"/>
+            <a:off x="569785" y="5060023"/>
+            <a:ext cx="2137025" cy="904126"/>
           </a:xfrm>
           <a:prstGeom prst="rect">
             <a:avLst/>
@@ -3979,8 +3969,8 @@
         </p:nvSpPr>
         <p:spPr>
           <a:xfrm>
-            <a:off x="6604996" y="4861389"/>
-            <a:ext cx="1589073" cy="636997"/>
+            <a:off x="9465280" y="5080573"/>
+            <a:ext cx="2137025" cy="904126"/>
           </a:xfrm>
           <a:prstGeom prst="rect">
             <a:avLst/>
@@ -4028,8 +4018,8 @@
         </p:nvSpPr>
         <p:spPr>
           <a:xfrm>
-            <a:off x="2283857" y="5645652"/>
-            <a:ext cx="1589072" cy="636997"/>
+            <a:off x="3534950" y="5060023"/>
+            <a:ext cx="2137025" cy="904126"/>
           </a:xfrm>
           <a:prstGeom prst="rect">
             <a:avLst/>
@@ -4077,8 +4067,8 @@
         </p:nvSpPr>
         <p:spPr>
           <a:xfrm>
-            <a:off x="4242364" y="5645652"/>
-            <a:ext cx="1589073" cy="636998"/>
+            <a:off x="6500115" y="5080573"/>
+            <a:ext cx="2137025" cy="904126"/>
           </a:xfrm>
           <a:prstGeom prst="rect">
             <a:avLst/>
@@ -4122,16 +4112,15 @@
             </a:extLst>
           </p:cNvPr>
           <p:cNvCxnSpPr>
-            <a:cxnSpLocks/>
             <a:stCxn id="7" idx="2"/>
             <a:endCxn id="23" idx="0"/>
           </p:cNvCxnSpPr>
           <p:nvPr/>
         </p:nvCxnSpPr>
         <p:spPr>
-          <a:xfrm>
-            <a:off x="1119885" y="4461098"/>
-            <a:ext cx="1" cy="985919"/>
+          <a:xfrm flipH="1">
+            <a:off x="1638298" y="4496657"/>
+            <a:ext cx="628866" cy="563366"/>
           </a:xfrm>
           <a:prstGeom prst="line">
             <a:avLst/>
@@ -4162,7 +4151,6 @@
             </a:extLst>
           </p:cNvPr>
           <p:cNvCxnSpPr>
-            <a:cxnSpLocks/>
             <a:stCxn id="8" idx="2"/>
             <a:endCxn id="27" idx="0"/>
           </p:cNvCxnSpPr>
@@ -4170,8 +4158,8 @@
         </p:nvCxnSpPr>
         <p:spPr>
           <a:xfrm flipH="1">
-            <a:off x="3078393" y="4910868"/>
-            <a:ext cx="773560" cy="734784"/>
+            <a:off x="4603463" y="4496657"/>
+            <a:ext cx="1442878" cy="563366"/>
           </a:xfrm>
           <a:prstGeom prst="line">
             <a:avLst/>
@@ -4202,7 +4190,6 @@
             </a:extLst>
           </p:cNvPr>
           <p:cNvCxnSpPr>
-            <a:cxnSpLocks/>
             <a:stCxn id="8" idx="2"/>
             <a:endCxn id="28" idx="0"/>
           </p:cNvCxnSpPr>
@@ -4210,8 +4197,8 @@
         </p:nvCxnSpPr>
         <p:spPr>
           <a:xfrm>
-            <a:off x="3851953" y="4910868"/>
-            <a:ext cx="1184948" cy="734784"/>
+            <a:off x="6046341" y="4496657"/>
+            <a:ext cx="1522287" cy="583916"/>
           </a:xfrm>
           <a:prstGeom prst="line">
             <a:avLst/>
@@ -4242,7 +4229,6 @@
             </a:extLst>
           </p:cNvPr>
           <p:cNvCxnSpPr>
-            <a:cxnSpLocks/>
             <a:stCxn id="9" idx="2"/>
             <a:endCxn id="24" idx="0"/>
           </p:cNvCxnSpPr>
@@ -4250,8 +4236,8 @@
         </p:nvCxnSpPr>
         <p:spPr>
           <a:xfrm>
-            <a:off x="5690707" y="4435794"/>
-            <a:ext cx="1708826" cy="425595"/>
+            <a:off x="9705654" y="4496657"/>
+            <a:ext cx="828139" cy="583916"/>
           </a:xfrm>
           <a:prstGeom prst="line">
             <a:avLst/>
@@ -4286,7 +4272,7 @@
         </p:nvSpPr>
         <p:spPr>
           <a:xfrm>
-            <a:off x="6604996" y="5507152"/>
+            <a:off x="9465280" y="6014212"/>
             <a:ext cx="2137025" cy="276999"/>
           </a:xfrm>
           <a:prstGeom prst="rect">
@@ -4335,7 +4321,7 @@
         </p:nvSpPr>
         <p:spPr>
           <a:xfrm>
-            <a:off x="4198702" y="6291415"/>
+            <a:off x="6555769" y="5984699"/>
             <a:ext cx="2137025" cy="276999"/>
           </a:xfrm>
           <a:prstGeom prst="rect">
@@ -4384,7 +4370,7 @@
         </p:nvSpPr>
         <p:spPr>
           <a:xfrm>
-            <a:off x="2168486" y="6348669"/>
+            <a:off x="3534949" y="5979159"/>
             <a:ext cx="2137025" cy="276999"/>
           </a:xfrm>
           <a:prstGeom prst="rect">
@@ -4433,7 +4419,7 @@
         </p:nvSpPr>
         <p:spPr>
           <a:xfrm>
-            <a:off x="138270" y="6097715"/>
+            <a:off x="569784" y="5979159"/>
             <a:ext cx="2137025" cy="276999"/>
           </a:xfrm>
           <a:prstGeom prst="rect">
@@ -4468,446 +4454,6 @@
           </a:p>
         </p:txBody>
       </p:sp>
-      <p:sp>
-        <p:nvSpPr>
-          <p:cNvPr id="78" name="Rectangle 77">
-            <a:extLst>
-              <a:ext uri="{FF2B5EF4-FFF2-40B4-BE49-F238E27FC236}">
-                <a16:creationId xmlns:a16="http://schemas.microsoft.com/office/drawing/2014/main" id="{184EEB32-26BE-0B42-9ACD-E669F8101B3A}"/>
-              </a:ext>
-            </a:extLst>
-          </p:cNvPr>
-          <p:cNvSpPr/>
-          <p:nvPr/>
-        </p:nvSpPr>
-        <p:spPr>
-          <a:xfrm>
-            <a:off x="6096000" y="77258"/>
-            <a:ext cx="1589071" cy="636998"/>
-          </a:xfrm>
-          <a:prstGeom prst="rect">
-            <a:avLst/>
-          </a:prstGeom>
-        </p:spPr>
-        <p:style>
-          <a:lnRef idx="2">
-            <a:schemeClr val="accent1">
-              <a:shade val="50000"/>
-            </a:schemeClr>
-          </a:lnRef>
-          <a:fillRef idx="1">
-            <a:schemeClr val="accent1"/>
-          </a:fillRef>
-          <a:effectRef idx="0">
-            <a:schemeClr val="accent1"/>
-          </a:effectRef>
-          <a:fontRef idx="minor">
-            <a:schemeClr val="lt1"/>
-          </a:fontRef>
-        </p:style>
-        <p:txBody>
-          <a:bodyPr rtlCol="0" anchor="ctr"/>
-          <a:lstStyle/>
-          <a:p>
-            <a:pPr algn="ctr"/>
-            <a:r>
-              <a:rPr lang="en-US" dirty="0"/>
-              <a:t>Navigation Container</a:t>
-            </a:r>
-          </a:p>
-        </p:txBody>
-      </p:sp>
-      <p:cxnSp>
-        <p:nvCxnSpPr>
-          <p:cNvPr id="80" name="Straight Connector 79">
-            <a:extLst>
-              <a:ext uri="{FF2B5EF4-FFF2-40B4-BE49-F238E27FC236}">
-                <a16:creationId xmlns:a16="http://schemas.microsoft.com/office/drawing/2014/main" id="{81180CD4-777E-EB42-8857-3372DC57F106}"/>
-              </a:ext>
-            </a:extLst>
-          </p:cNvPr>
-          <p:cNvCxnSpPr>
-            <a:stCxn id="78" idx="2"/>
-            <a:endCxn id="4" idx="0"/>
-          </p:cNvCxnSpPr>
-          <p:nvPr/>
-        </p:nvCxnSpPr>
-        <p:spPr>
-          <a:xfrm flipH="1">
-            <a:off x="3965826" y="714256"/>
-            <a:ext cx="2924710" cy="565079"/>
-          </a:xfrm>
-          <a:prstGeom prst="line">
-            <a:avLst/>
-          </a:prstGeom>
-        </p:spPr>
-        <p:style>
-          <a:lnRef idx="1">
-            <a:schemeClr val="accent1"/>
-          </a:lnRef>
-          <a:fillRef idx="0">
-            <a:schemeClr val="accent1"/>
-          </a:fillRef>
-          <a:effectRef idx="0">
-            <a:schemeClr val="accent1"/>
-          </a:effectRef>
-          <a:fontRef idx="minor">
-            <a:schemeClr val="tx1"/>
-          </a:fontRef>
-        </p:style>
-      </p:cxnSp>
-      <p:sp>
-        <p:nvSpPr>
-          <p:cNvPr id="81" name="Rectangle 80">
-            <a:extLst>
-              <a:ext uri="{FF2B5EF4-FFF2-40B4-BE49-F238E27FC236}">
-                <a16:creationId xmlns:a16="http://schemas.microsoft.com/office/drawing/2014/main" id="{12ED789B-DB1E-5E4E-99BA-E0A0FC0043FA}"/>
-              </a:ext>
-            </a:extLst>
-          </p:cNvPr>
-          <p:cNvSpPr/>
-          <p:nvPr/>
-        </p:nvSpPr>
-        <p:spPr>
-          <a:xfrm>
-            <a:off x="6335727" y="1319062"/>
-            <a:ext cx="1589071" cy="636998"/>
-          </a:xfrm>
-          <a:prstGeom prst="rect">
-            <a:avLst/>
-          </a:prstGeom>
-        </p:spPr>
-        <p:style>
-          <a:lnRef idx="2">
-            <a:schemeClr val="accent1">
-              <a:shade val="50000"/>
-            </a:schemeClr>
-          </a:lnRef>
-          <a:fillRef idx="1">
-            <a:schemeClr val="accent1"/>
-          </a:fillRef>
-          <a:effectRef idx="0">
-            <a:schemeClr val="accent1"/>
-          </a:effectRef>
-          <a:fontRef idx="minor">
-            <a:schemeClr val="lt1"/>
-          </a:fontRef>
-        </p:style>
-        <p:txBody>
-          <a:bodyPr rtlCol="0" anchor="ctr"/>
-          <a:lstStyle/>
-          <a:p>
-            <a:pPr algn="ctr"/>
-            <a:r>
-              <a:rPr lang="en-US" dirty="0"/>
-              <a:t>Loading Screen</a:t>
-            </a:r>
-          </a:p>
-        </p:txBody>
-      </p:sp>
-      <p:sp>
-        <p:nvSpPr>
-          <p:cNvPr id="82" name="Rectangle 81">
-            <a:extLst>
-              <a:ext uri="{FF2B5EF4-FFF2-40B4-BE49-F238E27FC236}">
-                <a16:creationId xmlns:a16="http://schemas.microsoft.com/office/drawing/2014/main" id="{8099B596-AD5A-464B-B58F-0DD8BFC7A93D}"/>
-              </a:ext>
-            </a:extLst>
-          </p:cNvPr>
-          <p:cNvSpPr/>
-          <p:nvPr/>
-        </p:nvSpPr>
-        <p:spPr>
-          <a:xfrm>
-            <a:off x="9221053" y="1295908"/>
-            <a:ext cx="1589071" cy="636998"/>
-          </a:xfrm>
-          <a:prstGeom prst="rect">
-            <a:avLst/>
-          </a:prstGeom>
-        </p:spPr>
-        <p:style>
-          <a:lnRef idx="2">
-            <a:schemeClr val="accent1">
-              <a:shade val="50000"/>
-            </a:schemeClr>
-          </a:lnRef>
-          <a:fillRef idx="1">
-            <a:schemeClr val="accent1"/>
-          </a:fillRef>
-          <a:effectRef idx="0">
-            <a:schemeClr val="accent1"/>
-          </a:effectRef>
-          <a:fontRef idx="minor">
-            <a:schemeClr val="lt1"/>
-          </a:fontRef>
-        </p:style>
-        <p:txBody>
-          <a:bodyPr rtlCol="0" anchor="ctr"/>
-          <a:lstStyle/>
-          <a:p>
-            <a:pPr algn="ctr"/>
-            <a:r>
-              <a:rPr lang="en-US" dirty="0"/>
-              <a:t>Auth Stack</a:t>
-            </a:r>
-          </a:p>
-        </p:txBody>
-      </p:sp>
-      <p:cxnSp>
-        <p:nvCxnSpPr>
-          <p:cNvPr id="84" name="Straight Connector 83">
-            <a:extLst>
-              <a:ext uri="{FF2B5EF4-FFF2-40B4-BE49-F238E27FC236}">
-                <a16:creationId xmlns:a16="http://schemas.microsoft.com/office/drawing/2014/main" id="{DB095BD7-308F-5B44-829D-D07FAD460CB5}"/>
-              </a:ext>
-            </a:extLst>
-          </p:cNvPr>
-          <p:cNvCxnSpPr>
-            <a:stCxn id="78" idx="2"/>
-            <a:endCxn id="81" idx="0"/>
-          </p:cNvCxnSpPr>
-          <p:nvPr/>
-        </p:nvCxnSpPr>
-        <p:spPr>
-          <a:xfrm>
-            <a:off x="6890536" y="714256"/>
-            <a:ext cx="239727" cy="604806"/>
-          </a:xfrm>
-          <a:prstGeom prst="line">
-            <a:avLst/>
-          </a:prstGeom>
-        </p:spPr>
-        <p:style>
-          <a:lnRef idx="1">
-            <a:schemeClr val="accent1"/>
-          </a:lnRef>
-          <a:fillRef idx="0">
-            <a:schemeClr val="accent1"/>
-          </a:fillRef>
-          <a:effectRef idx="0">
-            <a:schemeClr val="accent1"/>
-          </a:effectRef>
-          <a:fontRef idx="minor">
-            <a:schemeClr val="tx1"/>
-          </a:fontRef>
-        </p:style>
-      </p:cxnSp>
-      <p:cxnSp>
-        <p:nvCxnSpPr>
-          <p:cNvPr id="86" name="Straight Connector 85">
-            <a:extLst>
-              <a:ext uri="{FF2B5EF4-FFF2-40B4-BE49-F238E27FC236}">
-                <a16:creationId xmlns:a16="http://schemas.microsoft.com/office/drawing/2014/main" id="{FA0A2964-01C0-1340-B7B3-4FB71D4475B7}"/>
-              </a:ext>
-            </a:extLst>
-          </p:cNvPr>
-          <p:cNvCxnSpPr>
-            <a:stCxn id="78" idx="2"/>
-            <a:endCxn id="82" idx="0"/>
-          </p:cNvCxnSpPr>
-          <p:nvPr/>
-        </p:nvCxnSpPr>
-        <p:spPr>
-          <a:xfrm>
-            <a:off x="6890536" y="714256"/>
-            <a:ext cx="3125053" cy="581652"/>
-          </a:xfrm>
-          <a:prstGeom prst="line">
-            <a:avLst/>
-          </a:prstGeom>
-        </p:spPr>
-        <p:style>
-          <a:lnRef idx="1">
-            <a:schemeClr val="accent1"/>
-          </a:lnRef>
-          <a:fillRef idx="0">
-            <a:schemeClr val="accent1"/>
-          </a:fillRef>
-          <a:effectRef idx="0">
-            <a:schemeClr val="accent1"/>
-          </a:effectRef>
-          <a:fontRef idx="minor">
-            <a:schemeClr val="tx1"/>
-          </a:fontRef>
-        </p:style>
-      </p:cxnSp>
-      <p:sp>
-        <p:nvSpPr>
-          <p:cNvPr id="87" name="Rectangle 86">
-            <a:extLst>
-              <a:ext uri="{FF2B5EF4-FFF2-40B4-BE49-F238E27FC236}">
-                <a16:creationId xmlns:a16="http://schemas.microsoft.com/office/drawing/2014/main" id="{888D4715-5EC4-9E45-9529-898C2DF010E3}"/>
-              </a:ext>
-            </a:extLst>
-          </p:cNvPr>
-          <p:cNvSpPr/>
-          <p:nvPr/>
-        </p:nvSpPr>
-        <p:spPr>
-          <a:xfrm>
-            <a:off x="8194069" y="2446034"/>
-            <a:ext cx="1732908" cy="636997"/>
-          </a:xfrm>
-          <a:prstGeom prst="rect">
-            <a:avLst/>
-          </a:prstGeom>
-        </p:spPr>
-        <p:style>
-          <a:lnRef idx="2">
-            <a:schemeClr val="accent1">
-              <a:shade val="50000"/>
-            </a:schemeClr>
-          </a:lnRef>
-          <a:fillRef idx="1">
-            <a:schemeClr val="accent1"/>
-          </a:fillRef>
-          <a:effectRef idx="0">
-            <a:schemeClr val="accent1"/>
-          </a:effectRef>
-          <a:fontRef idx="minor">
-            <a:schemeClr val="lt1"/>
-          </a:fontRef>
-        </p:style>
-        <p:txBody>
-          <a:bodyPr rtlCol="0" anchor="ctr"/>
-          <a:lstStyle/>
-          <a:p>
-            <a:pPr algn="ctr"/>
-            <a:r>
-              <a:rPr lang="en-US" dirty="0"/>
-              <a:t>Sign Up Screen</a:t>
-            </a:r>
-          </a:p>
-        </p:txBody>
-      </p:sp>
-      <p:sp>
-        <p:nvSpPr>
-          <p:cNvPr id="88" name="Rectangle 87">
-            <a:extLst>
-              <a:ext uri="{FF2B5EF4-FFF2-40B4-BE49-F238E27FC236}">
-                <a16:creationId xmlns:a16="http://schemas.microsoft.com/office/drawing/2014/main" id="{814EB072-2E3E-C249-8A10-2F653A9A2C9F}"/>
-              </a:ext>
-            </a:extLst>
-          </p:cNvPr>
-          <p:cNvSpPr/>
-          <p:nvPr/>
-        </p:nvSpPr>
-        <p:spPr>
-          <a:xfrm>
-            <a:off x="10298562" y="2446034"/>
-            <a:ext cx="1732908" cy="636997"/>
-          </a:xfrm>
-          <a:prstGeom prst="rect">
-            <a:avLst/>
-          </a:prstGeom>
-        </p:spPr>
-        <p:style>
-          <a:lnRef idx="2">
-            <a:schemeClr val="accent1">
-              <a:shade val="50000"/>
-            </a:schemeClr>
-          </a:lnRef>
-          <a:fillRef idx="1">
-            <a:schemeClr val="accent1"/>
-          </a:fillRef>
-          <a:effectRef idx="0">
-            <a:schemeClr val="accent1"/>
-          </a:effectRef>
-          <a:fontRef idx="minor">
-            <a:schemeClr val="lt1"/>
-          </a:fontRef>
-        </p:style>
-        <p:txBody>
-          <a:bodyPr rtlCol="0" anchor="ctr"/>
-          <a:lstStyle/>
-          <a:p>
-            <a:pPr algn="ctr"/>
-            <a:r>
-              <a:rPr lang="en-US" dirty="0"/>
-              <a:t>Login Screen</a:t>
-            </a:r>
-          </a:p>
-        </p:txBody>
-      </p:sp>
-      <p:cxnSp>
-        <p:nvCxnSpPr>
-          <p:cNvPr id="90" name="Straight Connector 89">
-            <a:extLst>
-              <a:ext uri="{FF2B5EF4-FFF2-40B4-BE49-F238E27FC236}">
-                <a16:creationId xmlns:a16="http://schemas.microsoft.com/office/drawing/2014/main" id="{29308B35-E25C-2E49-BBF6-F16F04D1D591}"/>
-              </a:ext>
-            </a:extLst>
-          </p:cNvPr>
-          <p:cNvCxnSpPr>
-            <a:stCxn id="82" idx="2"/>
-            <a:endCxn id="87" idx="0"/>
-          </p:cNvCxnSpPr>
-          <p:nvPr/>
-        </p:nvCxnSpPr>
-        <p:spPr>
-          <a:xfrm flipH="1">
-            <a:off x="9060523" y="1932906"/>
-            <a:ext cx="955066" cy="513128"/>
-          </a:xfrm>
-          <a:prstGeom prst="line">
-            <a:avLst/>
-          </a:prstGeom>
-        </p:spPr>
-        <p:style>
-          <a:lnRef idx="1">
-            <a:schemeClr val="accent1"/>
-          </a:lnRef>
-          <a:fillRef idx="0">
-            <a:schemeClr val="accent1"/>
-          </a:fillRef>
-          <a:effectRef idx="0">
-            <a:schemeClr val="accent1"/>
-          </a:effectRef>
-          <a:fontRef idx="minor">
-            <a:schemeClr val="tx1"/>
-          </a:fontRef>
-        </p:style>
-      </p:cxnSp>
-      <p:cxnSp>
-        <p:nvCxnSpPr>
-          <p:cNvPr id="92" name="Straight Connector 91">
-            <a:extLst>
-              <a:ext uri="{FF2B5EF4-FFF2-40B4-BE49-F238E27FC236}">
-                <a16:creationId xmlns:a16="http://schemas.microsoft.com/office/drawing/2014/main" id="{DD1D89A0-4DCD-214D-9C91-398740B41C02}"/>
-              </a:ext>
-            </a:extLst>
-          </p:cNvPr>
-          <p:cNvCxnSpPr>
-            <a:stCxn id="82" idx="2"/>
-            <a:endCxn id="88" idx="0"/>
-          </p:cNvCxnSpPr>
-          <p:nvPr/>
-        </p:nvCxnSpPr>
-        <p:spPr>
-          <a:xfrm>
-            <a:off x="10015589" y="1932906"/>
-            <a:ext cx="1149427" cy="513128"/>
-          </a:xfrm>
-          <a:prstGeom prst="line">
-            <a:avLst/>
-          </a:prstGeom>
-        </p:spPr>
-        <p:style>
-          <a:lnRef idx="1">
-            <a:schemeClr val="accent1"/>
-          </a:lnRef>
-          <a:fillRef idx="0">
-            <a:schemeClr val="accent1"/>
-          </a:fillRef>
-          <a:effectRef idx="0">
-            <a:schemeClr val="accent1"/>
-          </a:effectRef>
-          <a:fontRef idx="minor">
-            <a:schemeClr val="tx1"/>
-          </a:fontRef>
-        </p:style>
-      </p:cxnSp>
     </p:spTree>
     <p:extLst>
       <p:ext uri="{BB962C8B-B14F-4D97-AF65-F5344CB8AC3E}">

</xml_diff>

<commit_message>
Updating navigation flow diagram
</commit_message>
<xml_diff>
--- a/docs/navigation-flow.pptx
+++ b/docs/navigation-flow.pptx
@@ -104,6 +104,11 @@
       </a:defRPr>
     </a:lvl9pPr>
   </p:defaultTextStyle>
+  <p:extLst>
+    <p:ext uri="{EFAFB233-063F-42B5-8137-9DF3F51BA10A}">
+      <p15:sldGuideLst xmlns:p15="http://schemas.microsoft.com/office/powerpoint/2012/main"/>
+    </p:ext>
+  </p:extLst>
 </p:presentation>
 </file>
 
@@ -254,7 +259,7 @@
           <a:p>
             <a:fld id="{BFE6E6C1-1C6F-C94D-9489-FC24A85AB066}" type="datetimeFigureOut">
               <a:rPr lang="en-US" smtClean="0"/>
-              <a:t>3/15/20</a:t>
+              <a:t>3/26/20</a:t>
             </a:fld>
             <a:endParaRPr lang="en-US"/>
           </a:p>
@@ -452,7 +457,7 @@
           <a:p>
             <a:fld id="{BFE6E6C1-1C6F-C94D-9489-FC24A85AB066}" type="datetimeFigureOut">
               <a:rPr lang="en-US" smtClean="0"/>
-              <a:t>3/15/20</a:t>
+              <a:t>3/26/20</a:t>
             </a:fld>
             <a:endParaRPr lang="en-US"/>
           </a:p>
@@ -660,7 +665,7 @@
           <a:p>
             <a:fld id="{BFE6E6C1-1C6F-C94D-9489-FC24A85AB066}" type="datetimeFigureOut">
               <a:rPr lang="en-US" smtClean="0"/>
-              <a:t>3/15/20</a:t>
+              <a:t>3/26/20</a:t>
             </a:fld>
             <a:endParaRPr lang="en-US"/>
           </a:p>
@@ -858,7 +863,7 @@
           <a:p>
             <a:fld id="{BFE6E6C1-1C6F-C94D-9489-FC24A85AB066}" type="datetimeFigureOut">
               <a:rPr lang="en-US" smtClean="0"/>
-              <a:t>3/15/20</a:t>
+              <a:t>3/26/20</a:t>
             </a:fld>
             <a:endParaRPr lang="en-US"/>
           </a:p>
@@ -1133,7 +1138,7 @@
           <a:p>
             <a:fld id="{BFE6E6C1-1C6F-C94D-9489-FC24A85AB066}" type="datetimeFigureOut">
               <a:rPr lang="en-US" smtClean="0"/>
-              <a:t>3/15/20</a:t>
+              <a:t>3/26/20</a:t>
             </a:fld>
             <a:endParaRPr lang="en-US"/>
           </a:p>
@@ -1398,7 +1403,7 @@
           <a:p>
             <a:fld id="{BFE6E6C1-1C6F-C94D-9489-FC24A85AB066}" type="datetimeFigureOut">
               <a:rPr lang="en-US" smtClean="0"/>
-              <a:t>3/15/20</a:t>
+              <a:t>3/26/20</a:t>
             </a:fld>
             <a:endParaRPr lang="en-US"/>
           </a:p>
@@ -1810,7 +1815,7 @@
           <a:p>
             <a:fld id="{BFE6E6C1-1C6F-C94D-9489-FC24A85AB066}" type="datetimeFigureOut">
               <a:rPr lang="en-US" smtClean="0"/>
-              <a:t>3/15/20</a:t>
+              <a:t>3/26/20</a:t>
             </a:fld>
             <a:endParaRPr lang="en-US"/>
           </a:p>
@@ -1951,7 +1956,7 @@
           <a:p>
             <a:fld id="{BFE6E6C1-1C6F-C94D-9489-FC24A85AB066}" type="datetimeFigureOut">
               <a:rPr lang="en-US" smtClean="0"/>
-              <a:t>3/15/20</a:t>
+              <a:t>3/26/20</a:t>
             </a:fld>
             <a:endParaRPr lang="en-US"/>
           </a:p>
@@ -2064,7 +2069,7 @@
           <a:p>
             <a:fld id="{BFE6E6C1-1C6F-C94D-9489-FC24A85AB066}" type="datetimeFigureOut">
               <a:rPr lang="en-US" smtClean="0"/>
-              <a:t>3/15/20</a:t>
+              <a:t>3/26/20</a:t>
             </a:fld>
             <a:endParaRPr lang="en-US"/>
           </a:p>
@@ -2375,7 +2380,7 @@
           <a:p>
             <a:fld id="{BFE6E6C1-1C6F-C94D-9489-FC24A85AB066}" type="datetimeFigureOut">
               <a:rPr lang="en-US" smtClean="0"/>
-              <a:t>3/15/20</a:t>
+              <a:t>3/26/20</a:t>
             </a:fld>
             <a:endParaRPr lang="en-US"/>
           </a:p>
@@ -2663,7 +2668,7 @@
           <a:p>
             <a:fld id="{BFE6E6C1-1C6F-C94D-9489-FC24A85AB066}" type="datetimeFigureOut">
               <a:rPr lang="en-US" smtClean="0"/>
-              <a:t>3/15/20</a:t>
+              <a:t>3/26/20</a:t>
             </a:fld>
             <a:endParaRPr lang="en-US"/>
           </a:p>
@@ -2904,7 +2909,7 @@
           <a:p>
             <a:fld id="{BFE6E6C1-1C6F-C94D-9489-FC24A85AB066}" type="datetimeFigureOut">
               <a:rPr lang="en-US" smtClean="0"/>
-              <a:t>3/15/20</a:t>
+              <a:t>3/26/20</a:t>
             </a:fld>
             <a:endParaRPr lang="en-US"/>
           </a:p>
@@ -3335,8 +3340,8 @@
         </p:nvSpPr>
         <p:spPr>
           <a:xfrm>
-            <a:off x="5633662" y="534257"/>
-            <a:ext cx="2137025" cy="904126"/>
+            <a:off x="3171290" y="1279335"/>
+            <a:ext cx="1589071" cy="636998"/>
           </a:xfrm>
           <a:prstGeom prst="rect">
             <a:avLst/>
@@ -3384,8 +3389,8 @@
         </p:nvSpPr>
         <p:spPr>
           <a:xfrm>
-            <a:off x="3789451" y="1929830"/>
-            <a:ext cx="2137025" cy="904126"/>
+            <a:off x="1747887" y="2356609"/>
+            <a:ext cx="1589072" cy="636997"/>
           </a:xfrm>
           <a:prstGeom prst="rect">
             <a:avLst/>
@@ -3433,8 +3438,8 @@
         </p:nvSpPr>
         <p:spPr>
           <a:xfrm>
-            <a:off x="7477876" y="1929830"/>
-            <a:ext cx="2137025" cy="904126"/>
+            <a:off x="4460698" y="2356609"/>
+            <a:ext cx="1732908" cy="636997"/>
           </a:xfrm>
           <a:prstGeom prst="rect">
             <a:avLst/>
@@ -3463,7 +3468,7 @@
             <a:pPr algn="ctr"/>
             <a:r>
               <a:rPr lang="en-US" dirty="0"/>
-              <a:t>Auth Screen</a:t>
+              <a:t>Modal Screen</a:t>
             </a:r>
           </a:p>
         </p:txBody>
@@ -3482,8 +3487,8 @@
         </p:nvSpPr>
         <p:spPr>
           <a:xfrm>
-            <a:off x="1198651" y="3592531"/>
-            <a:ext cx="2137025" cy="904126"/>
+            <a:off x="325349" y="3824101"/>
+            <a:ext cx="1589072" cy="636997"/>
           </a:xfrm>
           <a:prstGeom prst="rect">
             <a:avLst/>
@@ -3531,8 +3536,8 @@
         </p:nvSpPr>
         <p:spPr>
           <a:xfrm>
-            <a:off x="4977828" y="3592531"/>
-            <a:ext cx="2137025" cy="904126"/>
+            <a:off x="3057417" y="4273871"/>
+            <a:ext cx="1589072" cy="636997"/>
           </a:xfrm>
           <a:prstGeom prst="rect">
             <a:avLst/>
@@ -3580,8 +3585,8 @@
         </p:nvSpPr>
         <p:spPr>
           <a:xfrm>
-            <a:off x="8637141" y="3592531"/>
-            <a:ext cx="2137025" cy="904126"/>
+            <a:off x="4896171" y="3798797"/>
+            <a:ext cx="1589072" cy="636997"/>
           </a:xfrm>
           <a:prstGeom prst="rect">
             <a:avLst/>
@@ -3625,6 +3630,7 @@
             </a:extLst>
           </p:cNvPr>
           <p:cNvCxnSpPr>
+            <a:cxnSpLocks/>
             <a:stCxn id="4" idx="2"/>
             <a:endCxn id="5" idx="0"/>
           </p:cNvCxnSpPr>
@@ -3632,8 +3638,8 @@
         </p:nvCxnSpPr>
         <p:spPr>
           <a:xfrm flipH="1">
-            <a:off x="4857964" y="1438383"/>
-            <a:ext cx="1844211" cy="491447"/>
+            <a:off x="2542423" y="1916333"/>
+            <a:ext cx="1423403" cy="440276"/>
           </a:xfrm>
           <a:prstGeom prst="line">
             <a:avLst/>
@@ -3664,6 +3670,7 @@
             </a:extLst>
           </p:cNvPr>
           <p:cNvCxnSpPr>
+            <a:cxnSpLocks/>
             <a:stCxn id="4" idx="2"/>
             <a:endCxn id="6" idx="0"/>
           </p:cNvCxnSpPr>
@@ -3671,8 +3678,8 @@
         </p:nvCxnSpPr>
         <p:spPr>
           <a:xfrm>
-            <a:off x="6702175" y="1438383"/>
-            <a:ext cx="1844214" cy="491447"/>
+            <a:off x="3965826" y="1916333"/>
+            <a:ext cx="1361326" cy="440276"/>
           </a:xfrm>
           <a:prstGeom prst="line">
             <a:avLst/>
@@ -3703,6 +3710,7 @@
             </a:extLst>
           </p:cNvPr>
           <p:cNvCxnSpPr>
+            <a:cxnSpLocks/>
             <a:stCxn id="5" idx="2"/>
             <a:endCxn id="7" idx="0"/>
           </p:cNvCxnSpPr>
@@ -3710,8 +3718,8 @@
         </p:nvCxnSpPr>
         <p:spPr>
           <a:xfrm flipH="1">
-            <a:off x="2267164" y="2833956"/>
-            <a:ext cx="2590800" cy="758575"/>
+            <a:off x="1119885" y="2993606"/>
+            <a:ext cx="1422538" cy="830495"/>
           </a:xfrm>
           <a:prstGeom prst="line">
             <a:avLst/>
@@ -3742,6 +3750,7 @@
             </a:extLst>
           </p:cNvPr>
           <p:cNvCxnSpPr>
+            <a:cxnSpLocks/>
             <a:stCxn id="5" idx="2"/>
             <a:endCxn id="8" idx="0"/>
           </p:cNvCxnSpPr>
@@ -3749,8 +3758,8 @@
         </p:nvCxnSpPr>
         <p:spPr>
           <a:xfrm>
-            <a:off x="4857964" y="2833956"/>
-            <a:ext cx="1188377" cy="758575"/>
+            <a:off x="2542423" y="2993606"/>
+            <a:ext cx="1309530" cy="1280265"/>
           </a:xfrm>
           <a:prstGeom prst="line">
             <a:avLst/>
@@ -3781,6 +3790,7 @@
             </a:extLst>
           </p:cNvPr>
           <p:cNvCxnSpPr>
+            <a:cxnSpLocks/>
             <a:stCxn id="5" idx="2"/>
             <a:endCxn id="9" idx="0"/>
           </p:cNvCxnSpPr>
@@ -3788,8 +3798,8 @@
         </p:nvCxnSpPr>
         <p:spPr>
           <a:xfrm>
-            <a:off x="4857964" y="2833956"/>
-            <a:ext cx="4847690" cy="758575"/>
+            <a:off x="2542423" y="2993606"/>
+            <a:ext cx="3148284" cy="805191"/>
           </a:xfrm>
           <a:prstGeom prst="line">
             <a:avLst/>
@@ -3824,7 +3834,7 @@
         </p:nvSpPr>
         <p:spPr>
           <a:xfrm>
-            <a:off x="7770687" y="894256"/>
+            <a:off x="4760361" y="1475908"/>
             <a:ext cx="1732908" cy="276999"/>
           </a:xfrm>
           <a:prstGeom prst="rect">
@@ -3872,7 +3882,7 @@
         </p:nvSpPr>
         <p:spPr>
           <a:xfrm>
-            <a:off x="9614900" y="2243393"/>
+            <a:off x="4469256" y="2973462"/>
             <a:ext cx="1881881" cy="276999"/>
           </a:xfrm>
           <a:prstGeom prst="rect">
@@ -3920,8 +3930,8 @@
         </p:nvSpPr>
         <p:spPr>
           <a:xfrm>
-            <a:off x="569785" y="5060023"/>
-            <a:ext cx="2137025" cy="904126"/>
+            <a:off x="325349" y="5447017"/>
+            <a:ext cx="1589073" cy="636997"/>
           </a:xfrm>
           <a:prstGeom prst="rect">
             <a:avLst/>
@@ -3969,8 +3979,8 @@
         </p:nvSpPr>
         <p:spPr>
           <a:xfrm>
-            <a:off x="9465280" y="5080573"/>
-            <a:ext cx="2137025" cy="904126"/>
+            <a:off x="6604996" y="4861389"/>
+            <a:ext cx="1589073" cy="636997"/>
           </a:xfrm>
           <a:prstGeom prst="rect">
             <a:avLst/>
@@ -4018,8 +4028,8 @@
         </p:nvSpPr>
         <p:spPr>
           <a:xfrm>
-            <a:off x="3534950" y="5060023"/>
-            <a:ext cx="2137025" cy="904126"/>
+            <a:off x="2283857" y="5645652"/>
+            <a:ext cx="1589072" cy="636997"/>
           </a:xfrm>
           <a:prstGeom prst="rect">
             <a:avLst/>
@@ -4067,8 +4077,8 @@
         </p:nvSpPr>
         <p:spPr>
           <a:xfrm>
-            <a:off x="6500115" y="5080573"/>
-            <a:ext cx="2137025" cy="904126"/>
+            <a:off x="4242364" y="5645652"/>
+            <a:ext cx="1589073" cy="636998"/>
           </a:xfrm>
           <a:prstGeom prst="rect">
             <a:avLst/>
@@ -4112,15 +4122,16 @@
             </a:extLst>
           </p:cNvPr>
           <p:cNvCxnSpPr>
+            <a:cxnSpLocks/>
             <a:stCxn id="7" idx="2"/>
             <a:endCxn id="23" idx="0"/>
           </p:cNvCxnSpPr>
           <p:nvPr/>
         </p:nvCxnSpPr>
         <p:spPr>
-          <a:xfrm flipH="1">
-            <a:off x="1638298" y="4496657"/>
-            <a:ext cx="628866" cy="563366"/>
+          <a:xfrm>
+            <a:off x="1119885" y="4461098"/>
+            <a:ext cx="1" cy="985919"/>
           </a:xfrm>
           <a:prstGeom prst="line">
             <a:avLst/>
@@ -4151,6 +4162,7 @@
             </a:extLst>
           </p:cNvPr>
           <p:cNvCxnSpPr>
+            <a:cxnSpLocks/>
             <a:stCxn id="8" idx="2"/>
             <a:endCxn id="27" idx="0"/>
           </p:cNvCxnSpPr>
@@ -4158,8 +4170,8 @@
         </p:nvCxnSpPr>
         <p:spPr>
           <a:xfrm flipH="1">
-            <a:off x="4603463" y="4496657"/>
-            <a:ext cx="1442878" cy="563366"/>
+            <a:off x="3078393" y="4910868"/>
+            <a:ext cx="773560" cy="734784"/>
           </a:xfrm>
           <a:prstGeom prst="line">
             <a:avLst/>
@@ -4190,6 +4202,7 @@
             </a:extLst>
           </p:cNvPr>
           <p:cNvCxnSpPr>
+            <a:cxnSpLocks/>
             <a:stCxn id="8" idx="2"/>
             <a:endCxn id="28" idx="0"/>
           </p:cNvCxnSpPr>
@@ -4197,8 +4210,8 @@
         </p:nvCxnSpPr>
         <p:spPr>
           <a:xfrm>
-            <a:off x="6046341" y="4496657"/>
-            <a:ext cx="1522287" cy="583916"/>
+            <a:off x="3851953" y="4910868"/>
+            <a:ext cx="1184948" cy="734784"/>
           </a:xfrm>
           <a:prstGeom prst="line">
             <a:avLst/>
@@ -4229,6 +4242,7 @@
             </a:extLst>
           </p:cNvPr>
           <p:cNvCxnSpPr>
+            <a:cxnSpLocks/>
             <a:stCxn id="9" idx="2"/>
             <a:endCxn id="24" idx="0"/>
           </p:cNvCxnSpPr>
@@ -4236,8 +4250,8 @@
         </p:nvCxnSpPr>
         <p:spPr>
           <a:xfrm>
-            <a:off x="9705654" y="4496657"/>
-            <a:ext cx="828139" cy="583916"/>
+            <a:off x="5690707" y="4435794"/>
+            <a:ext cx="1708826" cy="425595"/>
           </a:xfrm>
           <a:prstGeom prst="line">
             <a:avLst/>
@@ -4272,7 +4286,7 @@
         </p:nvSpPr>
         <p:spPr>
           <a:xfrm>
-            <a:off x="9465280" y="6014212"/>
+            <a:off x="6604996" y="5507152"/>
             <a:ext cx="2137025" cy="276999"/>
           </a:xfrm>
           <a:prstGeom prst="rect">
@@ -4321,7 +4335,7 @@
         </p:nvSpPr>
         <p:spPr>
           <a:xfrm>
-            <a:off x="6555769" y="5984699"/>
+            <a:off x="4198702" y="6291415"/>
             <a:ext cx="2137025" cy="276999"/>
           </a:xfrm>
           <a:prstGeom prst="rect">
@@ -4370,7 +4384,7 @@
         </p:nvSpPr>
         <p:spPr>
           <a:xfrm>
-            <a:off x="3534949" y="5979159"/>
+            <a:off x="2168486" y="6348669"/>
             <a:ext cx="2137025" cy="276999"/>
           </a:xfrm>
           <a:prstGeom prst="rect">
@@ -4419,7 +4433,7 @@
         </p:nvSpPr>
         <p:spPr>
           <a:xfrm>
-            <a:off x="569784" y="5979159"/>
+            <a:off x="138270" y="6097715"/>
             <a:ext cx="2137025" cy="276999"/>
           </a:xfrm>
           <a:prstGeom prst="rect">
@@ -4454,6 +4468,446 @@
           </a:p>
         </p:txBody>
       </p:sp>
+      <p:sp>
+        <p:nvSpPr>
+          <p:cNvPr id="78" name="Rectangle 77">
+            <a:extLst>
+              <a:ext uri="{FF2B5EF4-FFF2-40B4-BE49-F238E27FC236}">
+                <a16:creationId xmlns:a16="http://schemas.microsoft.com/office/drawing/2014/main" id="{184EEB32-26BE-0B42-9ACD-E669F8101B3A}"/>
+              </a:ext>
+            </a:extLst>
+          </p:cNvPr>
+          <p:cNvSpPr/>
+          <p:nvPr/>
+        </p:nvSpPr>
+        <p:spPr>
+          <a:xfrm>
+            <a:off x="6096000" y="77258"/>
+            <a:ext cx="1589071" cy="636998"/>
+          </a:xfrm>
+          <a:prstGeom prst="rect">
+            <a:avLst/>
+          </a:prstGeom>
+        </p:spPr>
+        <p:style>
+          <a:lnRef idx="2">
+            <a:schemeClr val="accent1">
+              <a:shade val="50000"/>
+            </a:schemeClr>
+          </a:lnRef>
+          <a:fillRef idx="1">
+            <a:schemeClr val="accent1"/>
+          </a:fillRef>
+          <a:effectRef idx="0">
+            <a:schemeClr val="accent1"/>
+          </a:effectRef>
+          <a:fontRef idx="minor">
+            <a:schemeClr val="lt1"/>
+          </a:fontRef>
+        </p:style>
+        <p:txBody>
+          <a:bodyPr rtlCol="0" anchor="ctr"/>
+          <a:lstStyle/>
+          <a:p>
+            <a:pPr algn="ctr"/>
+            <a:r>
+              <a:rPr lang="en-US" dirty="0"/>
+              <a:t>Navigation Container</a:t>
+            </a:r>
+          </a:p>
+        </p:txBody>
+      </p:sp>
+      <p:cxnSp>
+        <p:nvCxnSpPr>
+          <p:cNvPr id="80" name="Straight Connector 79">
+            <a:extLst>
+              <a:ext uri="{FF2B5EF4-FFF2-40B4-BE49-F238E27FC236}">
+                <a16:creationId xmlns:a16="http://schemas.microsoft.com/office/drawing/2014/main" id="{81180CD4-777E-EB42-8857-3372DC57F106}"/>
+              </a:ext>
+            </a:extLst>
+          </p:cNvPr>
+          <p:cNvCxnSpPr>
+            <a:stCxn id="78" idx="2"/>
+            <a:endCxn id="4" idx="0"/>
+          </p:cNvCxnSpPr>
+          <p:nvPr/>
+        </p:nvCxnSpPr>
+        <p:spPr>
+          <a:xfrm flipH="1">
+            <a:off x="3965826" y="714256"/>
+            <a:ext cx="2924710" cy="565079"/>
+          </a:xfrm>
+          <a:prstGeom prst="line">
+            <a:avLst/>
+          </a:prstGeom>
+        </p:spPr>
+        <p:style>
+          <a:lnRef idx="1">
+            <a:schemeClr val="accent1"/>
+          </a:lnRef>
+          <a:fillRef idx="0">
+            <a:schemeClr val="accent1"/>
+          </a:fillRef>
+          <a:effectRef idx="0">
+            <a:schemeClr val="accent1"/>
+          </a:effectRef>
+          <a:fontRef idx="minor">
+            <a:schemeClr val="tx1"/>
+          </a:fontRef>
+        </p:style>
+      </p:cxnSp>
+      <p:sp>
+        <p:nvSpPr>
+          <p:cNvPr id="81" name="Rectangle 80">
+            <a:extLst>
+              <a:ext uri="{FF2B5EF4-FFF2-40B4-BE49-F238E27FC236}">
+                <a16:creationId xmlns:a16="http://schemas.microsoft.com/office/drawing/2014/main" id="{12ED789B-DB1E-5E4E-99BA-E0A0FC0043FA}"/>
+              </a:ext>
+            </a:extLst>
+          </p:cNvPr>
+          <p:cNvSpPr/>
+          <p:nvPr/>
+        </p:nvSpPr>
+        <p:spPr>
+          <a:xfrm>
+            <a:off x="6335727" y="1319062"/>
+            <a:ext cx="1589071" cy="636998"/>
+          </a:xfrm>
+          <a:prstGeom prst="rect">
+            <a:avLst/>
+          </a:prstGeom>
+        </p:spPr>
+        <p:style>
+          <a:lnRef idx="2">
+            <a:schemeClr val="accent1">
+              <a:shade val="50000"/>
+            </a:schemeClr>
+          </a:lnRef>
+          <a:fillRef idx="1">
+            <a:schemeClr val="accent1"/>
+          </a:fillRef>
+          <a:effectRef idx="0">
+            <a:schemeClr val="accent1"/>
+          </a:effectRef>
+          <a:fontRef idx="minor">
+            <a:schemeClr val="lt1"/>
+          </a:fontRef>
+        </p:style>
+        <p:txBody>
+          <a:bodyPr rtlCol="0" anchor="ctr"/>
+          <a:lstStyle/>
+          <a:p>
+            <a:pPr algn="ctr"/>
+            <a:r>
+              <a:rPr lang="en-US" dirty="0"/>
+              <a:t>Loading Screen</a:t>
+            </a:r>
+          </a:p>
+        </p:txBody>
+      </p:sp>
+      <p:sp>
+        <p:nvSpPr>
+          <p:cNvPr id="82" name="Rectangle 81">
+            <a:extLst>
+              <a:ext uri="{FF2B5EF4-FFF2-40B4-BE49-F238E27FC236}">
+                <a16:creationId xmlns:a16="http://schemas.microsoft.com/office/drawing/2014/main" id="{8099B596-AD5A-464B-B58F-0DD8BFC7A93D}"/>
+              </a:ext>
+            </a:extLst>
+          </p:cNvPr>
+          <p:cNvSpPr/>
+          <p:nvPr/>
+        </p:nvSpPr>
+        <p:spPr>
+          <a:xfrm>
+            <a:off x="9221053" y="1295908"/>
+            <a:ext cx="1589071" cy="636998"/>
+          </a:xfrm>
+          <a:prstGeom prst="rect">
+            <a:avLst/>
+          </a:prstGeom>
+        </p:spPr>
+        <p:style>
+          <a:lnRef idx="2">
+            <a:schemeClr val="accent1">
+              <a:shade val="50000"/>
+            </a:schemeClr>
+          </a:lnRef>
+          <a:fillRef idx="1">
+            <a:schemeClr val="accent1"/>
+          </a:fillRef>
+          <a:effectRef idx="0">
+            <a:schemeClr val="accent1"/>
+          </a:effectRef>
+          <a:fontRef idx="minor">
+            <a:schemeClr val="lt1"/>
+          </a:fontRef>
+        </p:style>
+        <p:txBody>
+          <a:bodyPr rtlCol="0" anchor="ctr"/>
+          <a:lstStyle/>
+          <a:p>
+            <a:pPr algn="ctr"/>
+            <a:r>
+              <a:rPr lang="en-US" dirty="0"/>
+              <a:t>Auth Stack</a:t>
+            </a:r>
+          </a:p>
+        </p:txBody>
+      </p:sp>
+      <p:cxnSp>
+        <p:nvCxnSpPr>
+          <p:cNvPr id="84" name="Straight Connector 83">
+            <a:extLst>
+              <a:ext uri="{FF2B5EF4-FFF2-40B4-BE49-F238E27FC236}">
+                <a16:creationId xmlns:a16="http://schemas.microsoft.com/office/drawing/2014/main" id="{DB095BD7-308F-5B44-829D-D07FAD460CB5}"/>
+              </a:ext>
+            </a:extLst>
+          </p:cNvPr>
+          <p:cNvCxnSpPr>
+            <a:stCxn id="78" idx="2"/>
+            <a:endCxn id="81" idx="0"/>
+          </p:cNvCxnSpPr>
+          <p:nvPr/>
+        </p:nvCxnSpPr>
+        <p:spPr>
+          <a:xfrm>
+            <a:off x="6890536" y="714256"/>
+            <a:ext cx="239727" cy="604806"/>
+          </a:xfrm>
+          <a:prstGeom prst="line">
+            <a:avLst/>
+          </a:prstGeom>
+        </p:spPr>
+        <p:style>
+          <a:lnRef idx="1">
+            <a:schemeClr val="accent1"/>
+          </a:lnRef>
+          <a:fillRef idx="0">
+            <a:schemeClr val="accent1"/>
+          </a:fillRef>
+          <a:effectRef idx="0">
+            <a:schemeClr val="accent1"/>
+          </a:effectRef>
+          <a:fontRef idx="minor">
+            <a:schemeClr val="tx1"/>
+          </a:fontRef>
+        </p:style>
+      </p:cxnSp>
+      <p:cxnSp>
+        <p:nvCxnSpPr>
+          <p:cNvPr id="86" name="Straight Connector 85">
+            <a:extLst>
+              <a:ext uri="{FF2B5EF4-FFF2-40B4-BE49-F238E27FC236}">
+                <a16:creationId xmlns:a16="http://schemas.microsoft.com/office/drawing/2014/main" id="{FA0A2964-01C0-1340-B7B3-4FB71D4475B7}"/>
+              </a:ext>
+            </a:extLst>
+          </p:cNvPr>
+          <p:cNvCxnSpPr>
+            <a:stCxn id="78" idx="2"/>
+            <a:endCxn id="82" idx="0"/>
+          </p:cNvCxnSpPr>
+          <p:nvPr/>
+        </p:nvCxnSpPr>
+        <p:spPr>
+          <a:xfrm>
+            <a:off x="6890536" y="714256"/>
+            <a:ext cx="3125053" cy="581652"/>
+          </a:xfrm>
+          <a:prstGeom prst="line">
+            <a:avLst/>
+          </a:prstGeom>
+        </p:spPr>
+        <p:style>
+          <a:lnRef idx="1">
+            <a:schemeClr val="accent1"/>
+          </a:lnRef>
+          <a:fillRef idx="0">
+            <a:schemeClr val="accent1"/>
+          </a:fillRef>
+          <a:effectRef idx="0">
+            <a:schemeClr val="accent1"/>
+          </a:effectRef>
+          <a:fontRef idx="minor">
+            <a:schemeClr val="tx1"/>
+          </a:fontRef>
+        </p:style>
+      </p:cxnSp>
+      <p:sp>
+        <p:nvSpPr>
+          <p:cNvPr id="87" name="Rectangle 86">
+            <a:extLst>
+              <a:ext uri="{FF2B5EF4-FFF2-40B4-BE49-F238E27FC236}">
+                <a16:creationId xmlns:a16="http://schemas.microsoft.com/office/drawing/2014/main" id="{888D4715-5EC4-9E45-9529-898C2DF010E3}"/>
+              </a:ext>
+            </a:extLst>
+          </p:cNvPr>
+          <p:cNvSpPr/>
+          <p:nvPr/>
+        </p:nvSpPr>
+        <p:spPr>
+          <a:xfrm>
+            <a:off x="8194069" y="2446034"/>
+            <a:ext cx="1732908" cy="636997"/>
+          </a:xfrm>
+          <a:prstGeom prst="rect">
+            <a:avLst/>
+          </a:prstGeom>
+        </p:spPr>
+        <p:style>
+          <a:lnRef idx="2">
+            <a:schemeClr val="accent1">
+              <a:shade val="50000"/>
+            </a:schemeClr>
+          </a:lnRef>
+          <a:fillRef idx="1">
+            <a:schemeClr val="accent1"/>
+          </a:fillRef>
+          <a:effectRef idx="0">
+            <a:schemeClr val="accent1"/>
+          </a:effectRef>
+          <a:fontRef idx="minor">
+            <a:schemeClr val="lt1"/>
+          </a:fontRef>
+        </p:style>
+        <p:txBody>
+          <a:bodyPr rtlCol="0" anchor="ctr"/>
+          <a:lstStyle/>
+          <a:p>
+            <a:pPr algn="ctr"/>
+            <a:r>
+              <a:rPr lang="en-US" dirty="0"/>
+              <a:t>Sign Up Screen</a:t>
+            </a:r>
+          </a:p>
+        </p:txBody>
+      </p:sp>
+      <p:sp>
+        <p:nvSpPr>
+          <p:cNvPr id="88" name="Rectangle 87">
+            <a:extLst>
+              <a:ext uri="{FF2B5EF4-FFF2-40B4-BE49-F238E27FC236}">
+                <a16:creationId xmlns:a16="http://schemas.microsoft.com/office/drawing/2014/main" id="{814EB072-2E3E-C249-8A10-2F653A9A2C9F}"/>
+              </a:ext>
+            </a:extLst>
+          </p:cNvPr>
+          <p:cNvSpPr/>
+          <p:nvPr/>
+        </p:nvSpPr>
+        <p:spPr>
+          <a:xfrm>
+            <a:off x="10298562" y="2446034"/>
+            <a:ext cx="1732908" cy="636997"/>
+          </a:xfrm>
+          <a:prstGeom prst="rect">
+            <a:avLst/>
+          </a:prstGeom>
+        </p:spPr>
+        <p:style>
+          <a:lnRef idx="2">
+            <a:schemeClr val="accent1">
+              <a:shade val="50000"/>
+            </a:schemeClr>
+          </a:lnRef>
+          <a:fillRef idx="1">
+            <a:schemeClr val="accent1"/>
+          </a:fillRef>
+          <a:effectRef idx="0">
+            <a:schemeClr val="accent1"/>
+          </a:effectRef>
+          <a:fontRef idx="minor">
+            <a:schemeClr val="lt1"/>
+          </a:fontRef>
+        </p:style>
+        <p:txBody>
+          <a:bodyPr rtlCol="0" anchor="ctr"/>
+          <a:lstStyle/>
+          <a:p>
+            <a:pPr algn="ctr"/>
+            <a:r>
+              <a:rPr lang="en-US" dirty="0"/>
+              <a:t>Login Screen</a:t>
+            </a:r>
+          </a:p>
+        </p:txBody>
+      </p:sp>
+      <p:cxnSp>
+        <p:nvCxnSpPr>
+          <p:cNvPr id="90" name="Straight Connector 89">
+            <a:extLst>
+              <a:ext uri="{FF2B5EF4-FFF2-40B4-BE49-F238E27FC236}">
+                <a16:creationId xmlns:a16="http://schemas.microsoft.com/office/drawing/2014/main" id="{29308B35-E25C-2E49-BBF6-F16F04D1D591}"/>
+              </a:ext>
+            </a:extLst>
+          </p:cNvPr>
+          <p:cNvCxnSpPr>
+            <a:stCxn id="82" idx="2"/>
+            <a:endCxn id="87" idx="0"/>
+          </p:cNvCxnSpPr>
+          <p:nvPr/>
+        </p:nvCxnSpPr>
+        <p:spPr>
+          <a:xfrm flipH="1">
+            <a:off x="9060523" y="1932906"/>
+            <a:ext cx="955066" cy="513128"/>
+          </a:xfrm>
+          <a:prstGeom prst="line">
+            <a:avLst/>
+          </a:prstGeom>
+        </p:spPr>
+        <p:style>
+          <a:lnRef idx="1">
+            <a:schemeClr val="accent1"/>
+          </a:lnRef>
+          <a:fillRef idx="0">
+            <a:schemeClr val="accent1"/>
+          </a:fillRef>
+          <a:effectRef idx="0">
+            <a:schemeClr val="accent1"/>
+          </a:effectRef>
+          <a:fontRef idx="minor">
+            <a:schemeClr val="tx1"/>
+          </a:fontRef>
+        </p:style>
+      </p:cxnSp>
+      <p:cxnSp>
+        <p:nvCxnSpPr>
+          <p:cNvPr id="92" name="Straight Connector 91">
+            <a:extLst>
+              <a:ext uri="{FF2B5EF4-FFF2-40B4-BE49-F238E27FC236}">
+                <a16:creationId xmlns:a16="http://schemas.microsoft.com/office/drawing/2014/main" id="{DD1D89A0-4DCD-214D-9C91-398740B41C02}"/>
+              </a:ext>
+            </a:extLst>
+          </p:cNvPr>
+          <p:cNvCxnSpPr>
+            <a:stCxn id="82" idx="2"/>
+            <a:endCxn id="88" idx="0"/>
+          </p:cNvCxnSpPr>
+          <p:nvPr/>
+        </p:nvCxnSpPr>
+        <p:spPr>
+          <a:xfrm>
+            <a:off x="10015589" y="1932906"/>
+            <a:ext cx="1149427" cy="513128"/>
+          </a:xfrm>
+          <a:prstGeom prst="line">
+            <a:avLst/>
+          </a:prstGeom>
+        </p:spPr>
+        <p:style>
+          <a:lnRef idx="1">
+            <a:schemeClr val="accent1"/>
+          </a:lnRef>
+          <a:fillRef idx="0">
+            <a:schemeClr val="accent1"/>
+          </a:fillRef>
+          <a:effectRef idx="0">
+            <a:schemeClr val="accent1"/>
+          </a:effectRef>
+          <a:fontRef idx="minor">
+            <a:schemeClr val="tx1"/>
+          </a:fontRef>
+        </p:style>
+      </p:cxnSp>
     </p:spTree>
     <p:extLst>
       <p:ext uri="{BB962C8B-B14F-4D97-AF65-F5344CB8AC3E}">

</xml_diff>

<commit_message>
Updating navigation stacks and removing layers
</commit_message>
<xml_diff>
--- a/docs/navigation-flow.pptx
+++ b/docs/navigation-flow.pptx
@@ -259,7 +259,7 @@
           <a:p>
             <a:fld id="{BFE6E6C1-1C6F-C94D-9489-FC24A85AB066}" type="datetimeFigureOut">
               <a:rPr lang="en-US" smtClean="0"/>
-              <a:t>3/26/20</a:t>
+              <a:t>3/27/20</a:t>
             </a:fld>
             <a:endParaRPr lang="en-US"/>
           </a:p>
@@ -457,7 +457,7 @@
           <a:p>
             <a:fld id="{BFE6E6C1-1C6F-C94D-9489-FC24A85AB066}" type="datetimeFigureOut">
               <a:rPr lang="en-US" smtClean="0"/>
-              <a:t>3/26/20</a:t>
+              <a:t>3/27/20</a:t>
             </a:fld>
             <a:endParaRPr lang="en-US"/>
           </a:p>
@@ -665,7 +665,7 @@
           <a:p>
             <a:fld id="{BFE6E6C1-1C6F-C94D-9489-FC24A85AB066}" type="datetimeFigureOut">
               <a:rPr lang="en-US" smtClean="0"/>
-              <a:t>3/26/20</a:t>
+              <a:t>3/27/20</a:t>
             </a:fld>
             <a:endParaRPr lang="en-US"/>
           </a:p>
@@ -863,7 +863,7 @@
           <a:p>
             <a:fld id="{BFE6E6C1-1C6F-C94D-9489-FC24A85AB066}" type="datetimeFigureOut">
               <a:rPr lang="en-US" smtClean="0"/>
-              <a:t>3/26/20</a:t>
+              <a:t>3/27/20</a:t>
             </a:fld>
             <a:endParaRPr lang="en-US"/>
           </a:p>
@@ -1138,7 +1138,7 @@
           <a:p>
             <a:fld id="{BFE6E6C1-1C6F-C94D-9489-FC24A85AB066}" type="datetimeFigureOut">
               <a:rPr lang="en-US" smtClean="0"/>
-              <a:t>3/26/20</a:t>
+              <a:t>3/27/20</a:t>
             </a:fld>
             <a:endParaRPr lang="en-US"/>
           </a:p>
@@ -1403,7 +1403,7 @@
           <a:p>
             <a:fld id="{BFE6E6C1-1C6F-C94D-9489-FC24A85AB066}" type="datetimeFigureOut">
               <a:rPr lang="en-US" smtClean="0"/>
-              <a:t>3/26/20</a:t>
+              <a:t>3/27/20</a:t>
             </a:fld>
             <a:endParaRPr lang="en-US"/>
           </a:p>
@@ -1815,7 +1815,7 @@
           <a:p>
             <a:fld id="{BFE6E6C1-1C6F-C94D-9489-FC24A85AB066}" type="datetimeFigureOut">
               <a:rPr lang="en-US" smtClean="0"/>
-              <a:t>3/26/20</a:t>
+              <a:t>3/27/20</a:t>
             </a:fld>
             <a:endParaRPr lang="en-US"/>
           </a:p>
@@ -1956,7 +1956,7 @@
           <a:p>
             <a:fld id="{BFE6E6C1-1C6F-C94D-9489-FC24A85AB066}" type="datetimeFigureOut">
               <a:rPr lang="en-US" smtClean="0"/>
-              <a:t>3/26/20</a:t>
+              <a:t>3/27/20</a:t>
             </a:fld>
             <a:endParaRPr lang="en-US"/>
           </a:p>
@@ -2069,7 +2069,7 @@
           <a:p>
             <a:fld id="{BFE6E6C1-1C6F-C94D-9489-FC24A85AB066}" type="datetimeFigureOut">
               <a:rPr lang="en-US" smtClean="0"/>
-              <a:t>3/26/20</a:t>
+              <a:t>3/27/20</a:t>
             </a:fld>
             <a:endParaRPr lang="en-US"/>
           </a:p>
@@ -2380,7 +2380,7 @@
           <a:p>
             <a:fld id="{BFE6E6C1-1C6F-C94D-9489-FC24A85AB066}" type="datetimeFigureOut">
               <a:rPr lang="en-US" smtClean="0"/>
-              <a:t>3/26/20</a:t>
+              <a:t>3/27/20</a:t>
             </a:fld>
             <a:endParaRPr lang="en-US"/>
           </a:p>
@@ -2668,7 +2668,7 @@
           <a:p>
             <a:fld id="{BFE6E6C1-1C6F-C94D-9489-FC24A85AB066}" type="datetimeFigureOut">
               <a:rPr lang="en-US" smtClean="0"/>
-              <a:t>3/26/20</a:t>
+              <a:t>3/27/20</a:t>
             </a:fld>
             <a:endParaRPr lang="en-US"/>
           </a:p>
@@ -2909,7 +2909,7 @@
           <a:p>
             <a:fld id="{BFE6E6C1-1C6F-C94D-9489-FC24A85AB066}" type="datetimeFigureOut">
               <a:rPr lang="en-US" smtClean="0"/>
-              <a:t>3/26/20</a:t>
+              <a:t>3/27/20</a:t>
             </a:fld>
             <a:endParaRPr lang="en-US"/>
           </a:p>
@@ -3340,7 +3340,7 @@
         </p:nvSpPr>
         <p:spPr>
           <a:xfrm>
-            <a:off x="3171290" y="1279335"/>
+            <a:off x="3520611" y="1310158"/>
             <a:ext cx="1589071" cy="636998"/>
           </a:xfrm>
           <a:prstGeom prst="rect">
@@ -3370,7 +3370,7 @@
             <a:pPr algn="ctr"/>
             <a:r>
               <a:rPr lang="en-US" dirty="0"/>
-              <a:t>Root Stack</a:t>
+              <a:t>App Stack</a:t>
             </a:r>
           </a:p>
         </p:txBody>
@@ -3389,7 +3389,7 @@
         </p:nvSpPr>
         <p:spPr>
           <a:xfrm>
-            <a:off x="1747887" y="2356609"/>
+            <a:off x="2097208" y="2387432"/>
             <a:ext cx="1589072" cy="636997"/>
           </a:xfrm>
           <a:prstGeom prst="rect">
@@ -3438,7 +3438,7 @@
         </p:nvSpPr>
         <p:spPr>
           <a:xfrm>
-            <a:off x="4460698" y="2356609"/>
+            <a:off x="4810019" y="2387432"/>
             <a:ext cx="1732908" cy="636997"/>
           </a:xfrm>
           <a:prstGeom prst="rect">
@@ -3487,7 +3487,7 @@
         </p:nvSpPr>
         <p:spPr>
           <a:xfrm>
-            <a:off x="325349" y="3824101"/>
+            <a:off x="674670" y="3854924"/>
             <a:ext cx="1589072" cy="636997"/>
           </a:xfrm>
           <a:prstGeom prst="rect">
@@ -3536,7 +3536,7 @@
         </p:nvSpPr>
         <p:spPr>
           <a:xfrm>
-            <a:off x="3057417" y="4273871"/>
+            <a:off x="3406738" y="4304694"/>
             <a:ext cx="1589072" cy="636997"/>
           </a:xfrm>
           <a:prstGeom prst="rect">
@@ -3585,7 +3585,7 @@
         </p:nvSpPr>
         <p:spPr>
           <a:xfrm>
-            <a:off x="4896171" y="3798797"/>
+            <a:off x="5245492" y="3829620"/>
             <a:ext cx="1589072" cy="636997"/>
           </a:xfrm>
           <a:prstGeom prst="rect">
@@ -3638,7 +3638,7 @@
         </p:nvCxnSpPr>
         <p:spPr>
           <a:xfrm flipH="1">
-            <a:off x="2542423" y="1916333"/>
+            <a:off x="2891744" y="1947156"/>
             <a:ext cx="1423403" cy="440276"/>
           </a:xfrm>
           <a:prstGeom prst="line">
@@ -3678,7 +3678,7 @@
         </p:nvCxnSpPr>
         <p:spPr>
           <a:xfrm>
-            <a:off x="3965826" y="1916333"/>
+            <a:off x="4315147" y="1947156"/>
             <a:ext cx="1361326" cy="440276"/>
           </a:xfrm>
           <a:prstGeom prst="line">
@@ -3718,7 +3718,7 @@
         </p:nvCxnSpPr>
         <p:spPr>
           <a:xfrm flipH="1">
-            <a:off x="1119885" y="2993606"/>
+            <a:off x="1469206" y="3024429"/>
             <a:ext cx="1422538" cy="830495"/>
           </a:xfrm>
           <a:prstGeom prst="line">
@@ -3758,7 +3758,7 @@
         </p:nvCxnSpPr>
         <p:spPr>
           <a:xfrm>
-            <a:off x="2542423" y="2993606"/>
+            <a:off x="2891744" y="3024429"/>
             <a:ext cx="1309530" cy="1280265"/>
           </a:xfrm>
           <a:prstGeom prst="line">
@@ -3798,7 +3798,7 @@
         </p:nvCxnSpPr>
         <p:spPr>
           <a:xfrm>
-            <a:off x="2542423" y="2993606"/>
+            <a:off x="2891744" y="3024429"/>
             <a:ext cx="3148284" cy="805191"/>
           </a:xfrm>
           <a:prstGeom prst="line">
@@ -3834,7 +3834,7 @@
         </p:nvSpPr>
         <p:spPr>
           <a:xfrm>
-            <a:off x="4760361" y="1475908"/>
+            <a:off x="5109682" y="1506731"/>
             <a:ext cx="1732908" cy="276999"/>
           </a:xfrm>
           <a:prstGeom prst="rect">
@@ -3882,7 +3882,7 @@
         </p:nvSpPr>
         <p:spPr>
           <a:xfrm>
-            <a:off x="4469256" y="2973462"/>
+            <a:off x="4818577" y="3004285"/>
             <a:ext cx="1881881" cy="276999"/>
           </a:xfrm>
           <a:prstGeom prst="rect">
@@ -3930,7 +3930,7 @@
         </p:nvSpPr>
         <p:spPr>
           <a:xfrm>
-            <a:off x="325349" y="5447017"/>
+            <a:off x="674670" y="5477840"/>
             <a:ext cx="1589073" cy="636997"/>
           </a:xfrm>
           <a:prstGeom prst="rect">
@@ -3979,7 +3979,7 @@
         </p:nvSpPr>
         <p:spPr>
           <a:xfrm>
-            <a:off x="6604996" y="4861389"/>
+            <a:off x="6954317" y="4892212"/>
             <a:ext cx="1589073" cy="636997"/>
           </a:xfrm>
           <a:prstGeom prst="rect">
@@ -4028,7 +4028,7 @@
         </p:nvSpPr>
         <p:spPr>
           <a:xfrm>
-            <a:off x="2283857" y="5645652"/>
+            <a:off x="2633178" y="5676475"/>
             <a:ext cx="1589072" cy="636997"/>
           </a:xfrm>
           <a:prstGeom prst="rect">
@@ -4077,7 +4077,7 @@
         </p:nvSpPr>
         <p:spPr>
           <a:xfrm>
-            <a:off x="4242364" y="5645652"/>
+            <a:off x="4591685" y="5676475"/>
             <a:ext cx="1589073" cy="636998"/>
           </a:xfrm>
           <a:prstGeom prst="rect">
@@ -4130,7 +4130,7 @@
         </p:nvCxnSpPr>
         <p:spPr>
           <a:xfrm>
-            <a:off x="1119885" y="4461098"/>
+            <a:off x="1469206" y="4491921"/>
             <a:ext cx="1" cy="985919"/>
           </a:xfrm>
           <a:prstGeom prst="line">
@@ -4170,7 +4170,7 @@
         </p:nvCxnSpPr>
         <p:spPr>
           <a:xfrm flipH="1">
-            <a:off x="3078393" y="4910868"/>
+            <a:off x="3427714" y="4941691"/>
             <a:ext cx="773560" cy="734784"/>
           </a:xfrm>
           <a:prstGeom prst="line">
@@ -4210,7 +4210,7 @@
         </p:nvCxnSpPr>
         <p:spPr>
           <a:xfrm>
-            <a:off x="3851953" y="4910868"/>
+            <a:off x="4201274" y="4941691"/>
             <a:ext cx="1184948" cy="734784"/>
           </a:xfrm>
           <a:prstGeom prst="line">
@@ -4250,7 +4250,7 @@
         </p:nvCxnSpPr>
         <p:spPr>
           <a:xfrm>
-            <a:off x="5690707" y="4435794"/>
+            <a:off x="6040028" y="4466617"/>
             <a:ext cx="1708826" cy="425595"/>
           </a:xfrm>
           <a:prstGeom prst="line">
@@ -4286,7 +4286,7 @@
         </p:nvSpPr>
         <p:spPr>
           <a:xfrm>
-            <a:off x="6604996" y="5507152"/>
+            <a:off x="6954317" y="5537975"/>
             <a:ext cx="2137025" cy="276999"/>
           </a:xfrm>
           <a:prstGeom prst="rect">
@@ -4335,7 +4335,7 @@
         </p:nvSpPr>
         <p:spPr>
           <a:xfrm>
-            <a:off x="4198702" y="6291415"/>
+            <a:off x="4548023" y="6322238"/>
             <a:ext cx="2137025" cy="276999"/>
           </a:xfrm>
           <a:prstGeom prst="rect">
@@ -4384,7 +4384,7 @@
         </p:nvSpPr>
         <p:spPr>
           <a:xfrm>
-            <a:off x="2168486" y="6348669"/>
+            <a:off x="2517807" y="6379492"/>
             <a:ext cx="2137025" cy="276999"/>
           </a:xfrm>
           <a:prstGeom prst="rect">
@@ -4433,7 +4433,7 @@
         </p:nvSpPr>
         <p:spPr>
           <a:xfrm>
-            <a:off x="138270" y="6097715"/>
+            <a:off x="487591" y="6128538"/>
             <a:ext cx="2137025" cy="276999"/>
           </a:xfrm>
           <a:prstGeom prst="rect">
@@ -4482,7 +4482,7 @@
         </p:nvSpPr>
         <p:spPr>
           <a:xfrm>
-            <a:off x="6096000" y="77258"/>
+            <a:off x="6445321" y="108081"/>
             <a:ext cx="1589071" cy="636998"/>
           </a:xfrm>
           <a:prstGeom prst="rect">
@@ -4534,7 +4534,7 @@
         </p:nvCxnSpPr>
         <p:spPr>
           <a:xfrm flipH="1">
-            <a:off x="3965826" y="714256"/>
+            <a:off x="4315147" y="745079"/>
             <a:ext cx="2924710" cy="565079"/>
           </a:xfrm>
           <a:prstGeom prst="line">
@@ -4558,10 +4558,10 @@
       </p:cxnSp>
       <p:sp>
         <p:nvSpPr>
-          <p:cNvPr id="81" name="Rectangle 80">
-            <a:extLst>
-              <a:ext uri="{FF2B5EF4-FFF2-40B4-BE49-F238E27FC236}">
-                <a16:creationId xmlns:a16="http://schemas.microsoft.com/office/drawing/2014/main" id="{12ED789B-DB1E-5E4E-99BA-E0A0FC0043FA}"/>
+          <p:cNvPr id="82" name="Rectangle 81">
+            <a:extLst>
+              <a:ext uri="{FF2B5EF4-FFF2-40B4-BE49-F238E27FC236}">
+                <a16:creationId xmlns:a16="http://schemas.microsoft.com/office/drawing/2014/main" id="{8099B596-AD5A-464B-B58F-0DD8BFC7A93D}"/>
               </a:ext>
             </a:extLst>
           </p:cNvPr>
@@ -4570,7 +4570,7 @@
         </p:nvSpPr>
         <p:spPr>
           <a:xfrm>
-            <a:off x="6335727" y="1319062"/>
+            <a:off x="8703920" y="1310158"/>
             <a:ext cx="1589071" cy="636998"/>
           </a:xfrm>
           <a:prstGeom prst="rect">
@@ -4600,17 +4600,56 @@
             <a:pPr algn="ctr"/>
             <a:r>
               <a:rPr lang="en-US" dirty="0"/>
-              <a:t>Loading Screen</a:t>
-            </a:r>
-          </a:p>
-        </p:txBody>
-      </p:sp>
-      <p:sp>
-        <p:nvSpPr>
-          <p:cNvPr id="82" name="Rectangle 81">
-            <a:extLst>
-              <a:ext uri="{FF2B5EF4-FFF2-40B4-BE49-F238E27FC236}">
-                <a16:creationId xmlns:a16="http://schemas.microsoft.com/office/drawing/2014/main" id="{8099B596-AD5A-464B-B58F-0DD8BFC7A93D}"/>
+              <a:t>Auth Stack</a:t>
+            </a:r>
+          </a:p>
+        </p:txBody>
+      </p:sp>
+      <p:cxnSp>
+        <p:nvCxnSpPr>
+          <p:cNvPr id="86" name="Straight Connector 85">
+            <a:extLst>
+              <a:ext uri="{FF2B5EF4-FFF2-40B4-BE49-F238E27FC236}">
+                <a16:creationId xmlns:a16="http://schemas.microsoft.com/office/drawing/2014/main" id="{FA0A2964-01C0-1340-B7B3-4FB71D4475B7}"/>
+              </a:ext>
+            </a:extLst>
+          </p:cNvPr>
+          <p:cNvCxnSpPr>
+            <a:stCxn id="78" idx="2"/>
+            <a:endCxn id="82" idx="0"/>
+          </p:cNvCxnSpPr>
+          <p:nvPr/>
+        </p:nvCxnSpPr>
+        <p:spPr>
+          <a:xfrm>
+            <a:off x="7239857" y="745079"/>
+            <a:ext cx="2258599" cy="565079"/>
+          </a:xfrm>
+          <a:prstGeom prst="line">
+            <a:avLst/>
+          </a:prstGeom>
+        </p:spPr>
+        <p:style>
+          <a:lnRef idx="1">
+            <a:schemeClr val="accent1"/>
+          </a:lnRef>
+          <a:fillRef idx="0">
+            <a:schemeClr val="accent1"/>
+          </a:fillRef>
+          <a:effectRef idx="0">
+            <a:schemeClr val="accent1"/>
+          </a:effectRef>
+          <a:fontRef idx="minor">
+            <a:schemeClr val="tx1"/>
+          </a:fontRef>
+        </p:style>
+      </p:cxnSp>
+      <p:sp>
+        <p:nvSpPr>
+          <p:cNvPr id="87" name="Rectangle 86">
+            <a:extLst>
+              <a:ext uri="{FF2B5EF4-FFF2-40B4-BE49-F238E27FC236}">
+                <a16:creationId xmlns:a16="http://schemas.microsoft.com/office/drawing/2014/main" id="{888D4715-5EC4-9E45-9529-898C2DF010E3}"/>
               </a:ext>
             </a:extLst>
           </p:cNvPr>
@@ -4619,8 +4658,8 @@
         </p:nvSpPr>
         <p:spPr>
           <a:xfrm>
-            <a:off x="9221053" y="1295908"/>
-            <a:ext cx="1589071" cy="636998"/>
+            <a:off x="7676936" y="2460284"/>
+            <a:ext cx="1732908" cy="636997"/>
           </a:xfrm>
           <a:prstGeom prst="rect">
             <a:avLst/>
@@ -4649,95 +4688,17 @@
             <a:pPr algn="ctr"/>
             <a:r>
               <a:rPr lang="en-US" dirty="0"/>
-              <a:t>Auth Stack</a:t>
-            </a:r>
-          </a:p>
-        </p:txBody>
-      </p:sp>
-      <p:cxnSp>
-        <p:nvCxnSpPr>
-          <p:cNvPr id="84" name="Straight Connector 83">
-            <a:extLst>
-              <a:ext uri="{FF2B5EF4-FFF2-40B4-BE49-F238E27FC236}">
-                <a16:creationId xmlns:a16="http://schemas.microsoft.com/office/drawing/2014/main" id="{DB095BD7-308F-5B44-829D-D07FAD460CB5}"/>
-              </a:ext>
-            </a:extLst>
-          </p:cNvPr>
-          <p:cNvCxnSpPr>
-            <a:stCxn id="78" idx="2"/>
-            <a:endCxn id="81" idx="0"/>
-          </p:cNvCxnSpPr>
-          <p:nvPr/>
-        </p:nvCxnSpPr>
-        <p:spPr>
-          <a:xfrm>
-            <a:off x="6890536" y="714256"/>
-            <a:ext cx="239727" cy="604806"/>
-          </a:xfrm>
-          <a:prstGeom prst="line">
-            <a:avLst/>
-          </a:prstGeom>
-        </p:spPr>
-        <p:style>
-          <a:lnRef idx="1">
-            <a:schemeClr val="accent1"/>
-          </a:lnRef>
-          <a:fillRef idx="0">
-            <a:schemeClr val="accent1"/>
-          </a:fillRef>
-          <a:effectRef idx="0">
-            <a:schemeClr val="accent1"/>
-          </a:effectRef>
-          <a:fontRef idx="minor">
-            <a:schemeClr val="tx1"/>
-          </a:fontRef>
-        </p:style>
-      </p:cxnSp>
-      <p:cxnSp>
-        <p:nvCxnSpPr>
-          <p:cNvPr id="86" name="Straight Connector 85">
-            <a:extLst>
-              <a:ext uri="{FF2B5EF4-FFF2-40B4-BE49-F238E27FC236}">
-                <a16:creationId xmlns:a16="http://schemas.microsoft.com/office/drawing/2014/main" id="{FA0A2964-01C0-1340-B7B3-4FB71D4475B7}"/>
-              </a:ext>
-            </a:extLst>
-          </p:cNvPr>
-          <p:cNvCxnSpPr>
-            <a:stCxn id="78" idx="2"/>
-            <a:endCxn id="82" idx="0"/>
-          </p:cNvCxnSpPr>
-          <p:nvPr/>
-        </p:nvCxnSpPr>
-        <p:spPr>
-          <a:xfrm>
-            <a:off x="6890536" y="714256"/>
-            <a:ext cx="3125053" cy="581652"/>
-          </a:xfrm>
-          <a:prstGeom prst="line">
-            <a:avLst/>
-          </a:prstGeom>
-        </p:spPr>
-        <p:style>
-          <a:lnRef idx="1">
-            <a:schemeClr val="accent1"/>
-          </a:lnRef>
-          <a:fillRef idx="0">
-            <a:schemeClr val="accent1"/>
-          </a:fillRef>
-          <a:effectRef idx="0">
-            <a:schemeClr val="accent1"/>
-          </a:effectRef>
-          <a:fontRef idx="minor">
-            <a:schemeClr val="tx1"/>
-          </a:fontRef>
-        </p:style>
-      </p:cxnSp>
-      <p:sp>
-        <p:nvSpPr>
-          <p:cNvPr id="87" name="Rectangle 86">
-            <a:extLst>
-              <a:ext uri="{FF2B5EF4-FFF2-40B4-BE49-F238E27FC236}">
-                <a16:creationId xmlns:a16="http://schemas.microsoft.com/office/drawing/2014/main" id="{888D4715-5EC4-9E45-9529-898C2DF010E3}"/>
+              <a:t>Sign Up Screen</a:t>
+            </a:r>
+          </a:p>
+        </p:txBody>
+      </p:sp>
+      <p:sp>
+        <p:nvSpPr>
+          <p:cNvPr id="88" name="Rectangle 87">
+            <a:extLst>
+              <a:ext uri="{FF2B5EF4-FFF2-40B4-BE49-F238E27FC236}">
+                <a16:creationId xmlns:a16="http://schemas.microsoft.com/office/drawing/2014/main" id="{814EB072-2E3E-C249-8A10-2F653A9A2C9F}"/>
               </a:ext>
             </a:extLst>
           </p:cNvPr>
@@ -4746,7 +4707,7 @@
         </p:nvSpPr>
         <p:spPr>
           <a:xfrm>
-            <a:off x="8194069" y="2446034"/>
+            <a:off x="9781429" y="2460284"/>
             <a:ext cx="1732908" cy="636997"/>
           </a:xfrm>
           <a:prstGeom prst="rect">
@@ -4776,55 +4737,6 @@
             <a:pPr algn="ctr"/>
             <a:r>
               <a:rPr lang="en-US" dirty="0"/>
-              <a:t>Sign Up Screen</a:t>
-            </a:r>
-          </a:p>
-        </p:txBody>
-      </p:sp>
-      <p:sp>
-        <p:nvSpPr>
-          <p:cNvPr id="88" name="Rectangle 87">
-            <a:extLst>
-              <a:ext uri="{FF2B5EF4-FFF2-40B4-BE49-F238E27FC236}">
-                <a16:creationId xmlns:a16="http://schemas.microsoft.com/office/drawing/2014/main" id="{814EB072-2E3E-C249-8A10-2F653A9A2C9F}"/>
-              </a:ext>
-            </a:extLst>
-          </p:cNvPr>
-          <p:cNvSpPr/>
-          <p:nvPr/>
-        </p:nvSpPr>
-        <p:spPr>
-          <a:xfrm>
-            <a:off x="10298562" y="2446034"/>
-            <a:ext cx="1732908" cy="636997"/>
-          </a:xfrm>
-          <a:prstGeom prst="rect">
-            <a:avLst/>
-          </a:prstGeom>
-        </p:spPr>
-        <p:style>
-          <a:lnRef idx="2">
-            <a:schemeClr val="accent1">
-              <a:shade val="50000"/>
-            </a:schemeClr>
-          </a:lnRef>
-          <a:fillRef idx="1">
-            <a:schemeClr val="accent1"/>
-          </a:fillRef>
-          <a:effectRef idx="0">
-            <a:schemeClr val="accent1"/>
-          </a:effectRef>
-          <a:fontRef idx="minor">
-            <a:schemeClr val="lt1"/>
-          </a:fontRef>
-        </p:style>
-        <p:txBody>
-          <a:bodyPr rtlCol="0" anchor="ctr"/>
-          <a:lstStyle/>
-          <a:p>
-            <a:pPr algn="ctr"/>
-            <a:r>
-              <a:rPr lang="en-US" dirty="0"/>
               <a:t>Login Screen</a:t>
             </a:r>
           </a:p>
@@ -4847,7 +4759,7 @@
         </p:nvCxnSpPr>
         <p:spPr>
           <a:xfrm flipH="1">
-            <a:off x="9060523" y="1932906"/>
+            <a:off x="8543390" y="1947156"/>
             <a:ext cx="955066" cy="513128"/>
           </a:xfrm>
           <a:prstGeom prst="line">
@@ -4886,7 +4798,7 @@
         </p:nvCxnSpPr>
         <p:spPr>
           <a:xfrm>
-            <a:off x="10015589" y="1932906"/>
+            <a:off x="9498456" y="1947156"/>
             <a:ext cx="1149427" cy="513128"/>
           </a:xfrm>
           <a:prstGeom prst="line">

</xml_diff>